<commit_message>
Rels are now read differently so as to create an associative array of slides to relIDs for each image, and for all occurrences an image within a slide to be associated with a location and size (so captions can be added easily).
Also started work on the writing of images and captions to a new copy of the document (but only just started!).
</commit_message>
<xml_diff>
--- a/public_html/test.pptx
+++ b/public_html/test.pptx
@@ -292,7 +292,7 @@
             <a:fld id="{1D8BD707-D9CF-40AE-B4C6-C98DA3205C09}" type="datetimeFigureOut">
               <a:rPr lang="en-US" smtClean="0"/>
               <a:pPr/>
-              <a:t>9/5/2013</a:t>
+              <a:t>4/28/2014</a:t>
             </a:fld>
             <a:endParaRPr lang="en-US"/>
           </a:p>
@@ -459,7 +459,7 @@
             <a:fld id="{1D8BD707-D9CF-40AE-B4C6-C98DA3205C09}" type="datetimeFigureOut">
               <a:rPr lang="en-US" smtClean="0"/>
               <a:pPr/>
-              <a:t>9/5/2013</a:t>
+              <a:t>4/28/2014</a:t>
             </a:fld>
             <a:endParaRPr lang="en-US"/>
           </a:p>
@@ -636,7 +636,7 @@
             <a:fld id="{1D8BD707-D9CF-40AE-B4C6-C98DA3205C09}" type="datetimeFigureOut">
               <a:rPr lang="en-US" smtClean="0"/>
               <a:pPr/>
-              <a:t>9/5/2013</a:t>
+              <a:t>4/28/2014</a:t>
             </a:fld>
             <a:endParaRPr lang="en-US"/>
           </a:p>
@@ -803,7 +803,7 @@
             <a:fld id="{1D8BD707-D9CF-40AE-B4C6-C98DA3205C09}" type="datetimeFigureOut">
               <a:rPr lang="en-US" smtClean="0"/>
               <a:pPr/>
-              <a:t>9/5/2013</a:t>
+              <a:t>4/28/2014</a:t>
             </a:fld>
             <a:endParaRPr lang="en-US"/>
           </a:p>
@@ -1046,7 +1046,7 @@
             <a:fld id="{1D8BD707-D9CF-40AE-B4C6-C98DA3205C09}" type="datetimeFigureOut">
               <a:rPr lang="en-US" smtClean="0"/>
               <a:pPr/>
-              <a:t>9/5/2013</a:t>
+              <a:t>4/28/2014</a:t>
             </a:fld>
             <a:endParaRPr lang="en-US"/>
           </a:p>
@@ -1331,7 +1331,7 @@
             <a:fld id="{1D8BD707-D9CF-40AE-B4C6-C98DA3205C09}" type="datetimeFigureOut">
               <a:rPr lang="en-US" smtClean="0"/>
               <a:pPr/>
-              <a:t>9/5/2013</a:t>
+              <a:t>4/28/2014</a:t>
             </a:fld>
             <a:endParaRPr lang="en-US"/>
           </a:p>
@@ -1750,7 +1750,7 @@
             <a:fld id="{1D8BD707-D9CF-40AE-B4C6-C98DA3205C09}" type="datetimeFigureOut">
               <a:rPr lang="en-US" smtClean="0"/>
               <a:pPr/>
-              <a:t>9/5/2013</a:t>
+              <a:t>4/28/2014</a:t>
             </a:fld>
             <a:endParaRPr lang="en-US"/>
           </a:p>
@@ -1865,7 +1865,7 @@
             <a:fld id="{1D8BD707-D9CF-40AE-B4C6-C98DA3205C09}" type="datetimeFigureOut">
               <a:rPr lang="en-US" smtClean="0"/>
               <a:pPr/>
-              <a:t>9/5/2013</a:t>
+              <a:t>4/28/2014</a:t>
             </a:fld>
             <a:endParaRPr lang="en-US"/>
           </a:p>
@@ -1957,7 +1957,7 @@
             <a:fld id="{1D8BD707-D9CF-40AE-B4C6-C98DA3205C09}" type="datetimeFigureOut">
               <a:rPr lang="en-US" smtClean="0"/>
               <a:pPr/>
-              <a:t>9/5/2013</a:t>
+              <a:t>4/28/2014</a:t>
             </a:fld>
             <a:endParaRPr lang="en-US"/>
           </a:p>
@@ -2231,7 +2231,7 @@
             <a:fld id="{1D8BD707-D9CF-40AE-B4C6-C98DA3205C09}" type="datetimeFigureOut">
               <a:rPr lang="en-US" smtClean="0"/>
               <a:pPr/>
-              <a:t>9/5/2013</a:t>
+              <a:t>4/28/2014</a:t>
             </a:fld>
             <a:endParaRPr lang="en-US"/>
           </a:p>
@@ -2481,7 +2481,7 @@
             <a:fld id="{1D8BD707-D9CF-40AE-B4C6-C98DA3205C09}" type="datetimeFigureOut">
               <a:rPr lang="en-US" smtClean="0"/>
               <a:pPr/>
-              <a:t>9/5/2013</a:t>
+              <a:t>4/28/2014</a:t>
             </a:fld>
             <a:endParaRPr lang="en-US"/>
           </a:p>
@@ -2691,7 +2691,7 @@
             <a:fld id="{1D8BD707-D9CF-40AE-B4C6-C98DA3205C09}" type="datetimeFigureOut">
               <a:rPr lang="en-US" smtClean="0"/>
               <a:pPr/>
-              <a:t>9/5/2013</a:t>
+              <a:t>4/28/2014</a:t>
             </a:fld>
             <a:endParaRPr lang="en-US"/>
           </a:p>
@@ -3191,6 +3191,47 @@
           <a:prstGeom prst="rect">
             <a:avLst/>
           </a:prstGeom>
+        </p:spPr>
+      </p:pic>
+      <p:pic>
+        <p:nvPicPr>
+          <p:cNvPr id="6" name="Picture 2" descr="\\soton.ac.uk\ude\personalfiles\users\rwf1v07\mydesktop\Bush-dog.jpg"/>
+          <p:cNvPicPr>
+            <a:picLocks noChangeAspect="1" noChangeArrowheads="1"/>
+          </p:cNvPicPr>
+          <p:nvPr/>
+        </p:nvPicPr>
+        <p:blipFill>
+          <a:blip r:embed="rId4">
+            <a:extLst>
+              <a:ext uri="{28A0092B-C50C-407E-A947-70E740481C1C}">
+                <a14:useLocalDpi xmlns:a14="http://schemas.microsoft.com/office/drawing/2010/main" val="0"/>
+              </a:ext>
+            </a:extLst>
+          </a:blip>
+          <a:srcRect/>
+          <a:stretch>
+            <a:fillRect/>
+          </a:stretch>
+        </p:blipFill>
+        <p:spPr bwMode="auto">
+          <a:xfrm>
+            <a:off x="6248400" y="724580"/>
+            <a:ext cx="1828800" cy="1819275"/>
+          </a:xfrm>
+          <a:prstGeom prst="rect">
+            <a:avLst/>
+          </a:prstGeom>
+          <a:noFill/>
+          <a:extLst>
+            <a:ext uri="{909E8E84-426E-40DD-AFC4-6F175D3DCCD1}">
+              <a14:hiddenFill xmlns:a14="http://schemas.microsoft.com/office/drawing/2010/main">
+                <a:solidFill>
+                  <a:srgbClr val="FFFFFF"/>
+                </a:solidFill>
+              </a14:hiddenFill>
+            </a:ext>
+          </a:extLst>
         </p:spPr>
       </p:pic>
     </p:spTree>

</xml_diff>

<commit_message>
A Word document now produces JSON so the text of the document can be rendered on the website and began work on writing captions for images within a Word document.
</commit_message>
<xml_diff>
--- a/public_html/test.pptx
+++ b/public_html/test.pptx
@@ -9,6 +9,7 @@
     <p:sldId id="257" r:id="rId3"/>
     <p:sldId id="258" r:id="rId4"/>
     <p:sldId id="259" r:id="rId5"/>
+    <p:sldId id="260" r:id="rId6"/>
   </p:sldIdLst>
   <p:sldSz cx="9144000" cy="6858000" type="screen4x3"/>
   <p:notesSz cx="6858000" cy="9144000"/>
@@ -292,7 +293,7 @@
             <a:fld id="{1D8BD707-D9CF-40AE-B4C6-C98DA3205C09}" type="datetimeFigureOut">
               <a:rPr lang="en-US" smtClean="0"/>
               <a:pPr/>
-              <a:t>4/28/2014</a:t>
+              <a:t>5/1/2014</a:t>
             </a:fld>
             <a:endParaRPr lang="en-US"/>
           </a:p>
@@ -459,7 +460,7 @@
             <a:fld id="{1D8BD707-D9CF-40AE-B4C6-C98DA3205C09}" type="datetimeFigureOut">
               <a:rPr lang="en-US" smtClean="0"/>
               <a:pPr/>
-              <a:t>4/28/2014</a:t>
+              <a:t>5/1/2014</a:t>
             </a:fld>
             <a:endParaRPr lang="en-US"/>
           </a:p>
@@ -636,7 +637,7 @@
             <a:fld id="{1D8BD707-D9CF-40AE-B4C6-C98DA3205C09}" type="datetimeFigureOut">
               <a:rPr lang="en-US" smtClean="0"/>
               <a:pPr/>
-              <a:t>4/28/2014</a:t>
+              <a:t>5/1/2014</a:t>
             </a:fld>
             <a:endParaRPr lang="en-US"/>
           </a:p>
@@ -803,7 +804,7 @@
             <a:fld id="{1D8BD707-D9CF-40AE-B4C6-C98DA3205C09}" type="datetimeFigureOut">
               <a:rPr lang="en-US" smtClean="0"/>
               <a:pPr/>
-              <a:t>4/28/2014</a:t>
+              <a:t>5/1/2014</a:t>
             </a:fld>
             <a:endParaRPr lang="en-US"/>
           </a:p>
@@ -1046,7 +1047,7 @@
             <a:fld id="{1D8BD707-D9CF-40AE-B4C6-C98DA3205C09}" type="datetimeFigureOut">
               <a:rPr lang="en-US" smtClean="0"/>
               <a:pPr/>
-              <a:t>4/28/2014</a:t>
+              <a:t>5/1/2014</a:t>
             </a:fld>
             <a:endParaRPr lang="en-US"/>
           </a:p>
@@ -1331,7 +1332,7 @@
             <a:fld id="{1D8BD707-D9CF-40AE-B4C6-C98DA3205C09}" type="datetimeFigureOut">
               <a:rPr lang="en-US" smtClean="0"/>
               <a:pPr/>
-              <a:t>4/28/2014</a:t>
+              <a:t>5/1/2014</a:t>
             </a:fld>
             <a:endParaRPr lang="en-US"/>
           </a:p>
@@ -1750,7 +1751,7 @@
             <a:fld id="{1D8BD707-D9CF-40AE-B4C6-C98DA3205C09}" type="datetimeFigureOut">
               <a:rPr lang="en-US" smtClean="0"/>
               <a:pPr/>
-              <a:t>4/28/2014</a:t>
+              <a:t>5/1/2014</a:t>
             </a:fld>
             <a:endParaRPr lang="en-US"/>
           </a:p>
@@ -1865,7 +1866,7 @@
             <a:fld id="{1D8BD707-D9CF-40AE-B4C6-C98DA3205C09}" type="datetimeFigureOut">
               <a:rPr lang="en-US" smtClean="0"/>
               <a:pPr/>
-              <a:t>4/28/2014</a:t>
+              <a:t>5/1/2014</a:t>
             </a:fld>
             <a:endParaRPr lang="en-US"/>
           </a:p>
@@ -1957,7 +1958,7 @@
             <a:fld id="{1D8BD707-D9CF-40AE-B4C6-C98DA3205C09}" type="datetimeFigureOut">
               <a:rPr lang="en-US" smtClean="0"/>
               <a:pPr/>
-              <a:t>4/28/2014</a:t>
+              <a:t>5/1/2014</a:t>
             </a:fld>
             <a:endParaRPr lang="en-US"/>
           </a:p>
@@ -2231,7 +2232,7 @@
             <a:fld id="{1D8BD707-D9CF-40AE-B4C6-C98DA3205C09}" type="datetimeFigureOut">
               <a:rPr lang="en-US" smtClean="0"/>
               <a:pPr/>
-              <a:t>4/28/2014</a:t>
+              <a:t>5/1/2014</a:t>
             </a:fld>
             <a:endParaRPr lang="en-US"/>
           </a:p>
@@ -2481,7 +2482,7 @@
             <a:fld id="{1D8BD707-D9CF-40AE-B4C6-C98DA3205C09}" type="datetimeFigureOut">
               <a:rPr lang="en-US" smtClean="0"/>
               <a:pPr/>
-              <a:t>4/28/2014</a:t>
+              <a:t>5/1/2014</a:t>
             </a:fld>
             <a:endParaRPr lang="en-US"/>
           </a:p>
@@ -2691,7 +2692,7 @@
             <a:fld id="{1D8BD707-D9CF-40AE-B4C6-C98DA3205C09}" type="datetimeFigureOut">
               <a:rPr lang="en-US" smtClean="0"/>
               <a:pPr/>
-              <a:t>4/28/2014</a:t>
+              <a:t>5/1/2014</a:t>
             </a:fld>
             <a:endParaRPr lang="en-US"/>
           </a:p>
@@ -3486,6 +3487,88 @@
 </p:sld>
 </file>
 
+<file path=ppt/slides/slide5.xml><?xml version="1.0" encoding="utf-8"?>
+<p:sld xmlns:a="http://schemas.openxmlformats.org/drawingml/2006/main" xmlns:r="http://schemas.openxmlformats.org/officeDocument/2006/relationships" xmlns:p="http://schemas.openxmlformats.org/presentationml/2006/main">
+  <p:cSld>
+    <p:bg>
+      <p:bgPr>
+        <a:blipFill dpi="0" rotWithShape="1">
+          <a:blip r:embed="rId2">
+            <a:lum/>
+          </a:blip>
+          <a:srcRect/>
+          <a:stretch>
+            <a:fillRect/>
+          </a:stretch>
+        </a:blipFill>
+        <a:effectLst/>
+      </p:bgPr>
+    </p:bg>
+    <p:spTree>
+      <p:nvGrpSpPr>
+        <p:cNvPr id="1" name=""/>
+        <p:cNvGrpSpPr/>
+        <p:nvPr/>
+      </p:nvGrpSpPr>
+      <p:grpSpPr>
+        <a:xfrm>
+          <a:off x="0" y="0"/>
+          <a:ext cx="0" cy="0"/>
+          <a:chOff x="0" y="0"/>
+          <a:chExt cx="0" cy="0"/>
+        </a:xfrm>
+      </p:grpSpPr>
+      <p:sp>
+        <p:nvSpPr>
+          <p:cNvPr id="2" name="Title 1"/>
+          <p:cNvSpPr>
+            <a:spLocks noGrp="1"/>
+          </p:cNvSpPr>
+          <p:nvPr>
+            <p:ph type="title"/>
+          </p:nvPr>
+        </p:nvSpPr>
+        <p:spPr/>
+        <p:txBody>
+          <a:bodyPr/>
+          <a:lstStyle/>
+          <a:p>
+            <a:endParaRPr lang="en-GB"/>
+          </a:p>
+        </p:txBody>
+      </p:sp>
+      <p:sp>
+        <p:nvSpPr>
+          <p:cNvPr id="3" name="Content Placeholder 2"/>
+          <p:cNvSpPr>
+            <a:spLocks noGrp="1"/>
+          </p:cNvSpPr>
+          <p:nvPr>
+            <p:ph idx="1"/>
+          </p:nvPr>
+        </p:nvSpPr>
+        <p:spPr/>
+        <p:txBody>
+          <a:bodyPr/>
+          <a:lstStyle/>
+          <a:p>
+            <a:endParaRPr lang="en-GB"/>
+          </a:p>
+        </p:txBody>
+      </p:sp>
+    </p:spTree>
+    <p:extLst>
+      <p:ext uri="{BB962C8B-B14F-4D97-AF65-F5344CB8AC3E}">
+        <p14:creationId xmlns:p14="http://schemas.microsoft.com/office/powerpoint/2010/main" val="3598295773"/>
+      </p:ext>
+    </p:extLst>
+  </p:cSld>
+  <p:clrMapOvr>
+    <a:masterClrMapping/>
+  </p:clrMapOvr>
+</p:sld>
+</file>
+
 <file path=ppt/theme/theme1.xml><?xml version="1.0" encoding="utf-8"?>
 <a:theme xmlns:a="http://schemas.openxmlformats.org/drawingml/2006/main" name="Office Theme">
   <a:themeElements>

</xml_diff>